<commit_message>
Update after bootcamp Depok January 2019
</commit_message>
<xml_diff>
--- a/Materi/2-CSS-Keynote.pptx
+++ b/Materi/2-CSS-Keynote.pptx
@@ -334,6 +334,11 @@
       </a:defRPr>
     </a:lvl9pPr>
   </p:defaultTextStyle>
+  <p:extLst>
+    <p:ext uri="{EFAFB233-063F-42B5-8137-9DF3F51BA10A}">
+      <p15:sldGuideLst xmlns:p15="http://schemas.microsoft.com/office/powerpoint/2012/main"/>
+    </p:ext>
+  </p:extLst>
 </p:presentation>
 </file>
 
@@ -3150,6 +3155,13 @@
     <a:masterClrMapping/>
   </p:clrMapOvr>
   <p:transition spd="med"/>
+  <p:timing>
+    <p:tnLst>
+      <p:par>
+        <p:cTn id="1" dur="indefinite" restart="never" nodeType="tmRoot"/>
+      </p:par>
+    </p:tnLst>
+  </p:timing>
 </p:sld>
 </file>
 
@@ -3243,6 +3255,13 @@
     <a:masterClrMapping/>
   </p:clrMapOvr>
   <p:transition spd="slow"/>
+  <p:timing>
+    <p:tnLst>
+      <p:par>
+        <p:cTn id="1" dur="indefinite" restart="never" nodeType="tmRoot"/>
+      </p:par>
+    </p:tnLst>
+  </p:timing>
 </p:sld>
 </file>
 
@@ -3306,6 +3325,13 @@
     <a:masterClrMapping/>
   </p:clrMapOvr>
   <p:transition spd="slow"/>
+  <p:timing>
+    <p:tnLst>
+      <p:par>
+        <p:cTn id="1" dur="indefinite" restart="never" nodeType="tmRoot"/>
+      </p:par>
+    </p:tnLst>
+  </p:timing>
 </p:sld>
 </file>
 
@@ -3375,7 +3401,7 @@
         <p:spPr>
           <a:xfrm>
             <a:off x="558800" y="1183216"/>
-            <a:ext cx="6619131" cy="6108701"/>
+            <a:ext cx="6924973" cy="6196568"/>
           </a:xfrm>
           <a:prstGeom prst="rect">
             <a:avLst/>
@@ -3404,62 +3430,82 @@
               </a:defRPr>
             </a:pPr>
             <a:r>
-              <a:t>css dan id kita sebut selector</a:t>
+              <a:rPr smtClean="0"/>
+              <a:t>c</a:t>
+            </a:r>
+            <a:r>
+              <a:rPr lang="en-US" smtClean="0"/>
+              <a:t>la</a:t>
+            </a:r>
+            <a:r>
+              <a:rPr smtClean="0"/>
+              <a:t>ss </a:t>
+            </a:r>
+            <a:r>
+              <a:t>dan id kita sebut selector</a:t>
             </a:r>
           </a:p>
           <a:p>
             <a:pPr algn="l"/>
-            <a:endParaRPr/>
+            <a:endParaRPr dirty="0"/>
           </a:p>
           <a:p>
             <a:pPr algn="l"/>
             <a:r>
+              <a:rPr dirty="0"/>
               <a:t>&lt;p class=“main-text”&gt;</a:t>
             </a:r>
           </a:p>
           <a:p>
             <a:pPr algn="l"/>
             <a:r>
+              <a:rPr dirty="0"/>
               <a:t>&lt;p class=“profile-text”&gt;</a:t>
             </a:r>
           </a:p>
           <a:p>
             <a:pPr algn="l"/>
-            <a:endParaRPr/>
+            <a:endParaRPr dirty="0"/>
           </a:p>
           <a:p>
             <a:pPr algn="l"/>
             <a:r>
+              <a:rPr dirty="0"/>
               <a:t>.main-text {</a:t>
             </a:r>
           </a:p>
           <a:p>
             <a:pPr lvl="1" algn="l"/>
             <a:r>
+              <a:rPr dirty="0"/>
               <a:t>text-align: justify;</a:t>
             </a:r>
           </a:p>
           <a:p>
             <a:pPr algn="l"/>
             <a:r>
+              <a:rPr dirty="0"/>
               <a:t>}</a:t>
             </a:r>
           </a:p>
           <a:p>
             <a:pPr algn="l"/>
             <a:r>
+              <a:rPr dirty="0"/>
               <a:t>.profile-text {</a:t>
             </a:r>
           </a:p>
           <a:p>
             <a:pPr lvl="1" algn="l"/>
             <a:r>
+              <a:rPr dirty="0"/>
               <a:t>font-size: 22px;</a:t>
             </a:r>
           </a:p>
           <a:p>
             <a:pPr algn="l"/>
             <a:r>
+              <a:rPr dirty="0"/>
               <a:t>}</a:t>
             </a:r>
           </a:p>
@@ -3508,6 +3554,13 @@
     <a:masterClrMapping/>
   </p:clrMapOvr>
   <p:transition spd="slow"/>
+  <p:timing>
+    <p:tnLst>
+      <p:par>
+        <p:cTn id="1" dur="indefinite" restart="never" nodeType="tmRoot"/>
+      </p:par>
+    </p:tnLst>
+  </p:timing>
 </p:sld>
 </file>
 
@@ -3908,6 +3961,13 @@
     <a:masterClrMapping/>
   </p:clrMapOvr>
   <p:transition spd="slow"/>
+  <p:timing>
+    <p:tnLst>
+      <p:par>
+        <p:cTn id="1" dur="indefinite" restart="never" nodeType="tmRoot"/>
+      </p:par>
+    </p:tnLst>
+  </p:timing>
 </p:sld>
 </file>
 
@@ -4109,6 +4169,13 @@
     <a:masterClrMapping/>
   </p:clrMapOvr>
   <p:transition spd="slow"/>
+  <p:timing>
+    <p:tnLst>
+      <p:par>
+        <p:cTn id="1" dur="indefinite" restart="never" nodeType="tmRoot"/>
+      </p:par>
+    </p:tnLst>
+  </p:timing>
 </p:sld>
 </file>
 
@@ -5204,6 +5271,13 @@
     <a:masterClrMapping/>
   </p:clrMapOvr>
   <p:transition spd="slow"/>
+  <p:timing>
+    <p:tnLst>
+      <p:par>
+        <p:cTn id="1" dur="indefinite" restart="never" nodeType="tmRoot"/>
+      </p:par>
+    </p:tnLst>
+  </p:timing>
 </p:sld>
 </file>
 
@@ -6756,6 +6830,13 @@
     <a:masterClrMapping/>
   </p:clrMapOvr>
   <p:transition spd="slow"/>
+  <p:timing>
+    <p:tnLst>
+      <p:par>
+        <p:cTn id="1" dur="indefinite" restart="never" nodeType="tmRoot"/>
+      </p:par>
+    </p:tnLst>
+  </p:timing>
 </p:sld>
 </file>
 
@@ -7031,6 +7112,13 @@
     <a:masterClrMapping/>
   </p:clrMapOvr>
   <p:transition spd="slow"/>
+  <p:timing>
+    <p:tnLst>
+      <p:par>
+        <p:cTn id="1" dur="indefinite" restart="never" nodeType="tmRoot"/>
+      </p:par>
+    </p:tnLst>
+  </p:timing>
 </p:sld>
 </file>
 
@@ -7094,6 +7182,13 @@
     <a:masterClrMapping/>
   </p:clrMapOvr>
   <p:transition spd="slow"/>
+  <p:timing>
+    <p:tnLst>
+      <p:par>
+        <p:cTn id="1" dur="indefinite" restart="never" nodeType="tmRoot"/>
+      </p:par>
+    </p:tnLst>
+  </p:timing>
 </p:sld>
 </file>
 
@@ -7248,6 +7343,13 @@
     <a:masterClrMapping/>
   </p:clrMapOvr>
   <p:transition spd="slow"/>
+  <p:timing>
+    <p:tnLst>
+      <p:par>
+        <p:cTn id="1" dur="indefinite" restart="never" nodeType="tmRoot"/>
+      </p:par>
+    </p:tnLst>
+  </p:timing>
 </p:sld>
 </file>
 
@@ -7413,6 +7515,13 @@
     <a:masterClrMapping/>
   </p:clrMapOvr>
   <p:transition spd="slow"/>
+  <p:timing>
+    <p:tnLst>
+      <p:par>
+        <p:cTn id="1" dur="indefinite" restart="never" nodeType="tmRoot"/>
+      </p:par>
+    </p:tnLst>
+  </p:timing>
 </p:sld>
 </file>
 
@@ -7556,6 +7665,13 @@
     <a:masterClrMapping/>
   </p:clrMapOvr>
   <p:transition spd="slow"/>
+  <p:timing>
+    <p:tnLst>
+      <p:par>
+        <p:cTn id="1" dur="indefinite" restart="never" nodeType="tmRoot"/>
+      </p:par>
+    </p:tnLst>
+  </p:timing>
 </p:sld>
 </file>
 
@@ -7712,6 +7828,13 @@
     <a:masterClrMapping/>
   </p:clrMapOvr>
   <p:transition spd="slow"/>
+  <p:timing>
+    <p:tnLst>
+      <p:par>
+        <p:cTn id="1" dur="indefinite" restart="never" nodeType="tmRoot"/>
+      </p:par>
+    </p:tnLst>
+  </p:timing>
 </p:sld>
 </file>
 

</xml_diff>